<commit_message>
typo: IDF => IFD
</commit_message>
<xml_diff>
--- a/content/2016/11/05/tiff.pptx
+++ b/content/2016/11/05/tiff.pptx
@@ -4122,8 +4122,21 @@
                   <a:schemeClr val="tx1"/>
                 </a:solidFill>
               </a:rPr>
-              <a:t>IDF</a:t>
-            </a:r>
+              <a:t>IF</a:t>
+            </a:r>
+            <a:r>
+              <a:rPr kumimoji="1" lang="en-US" altLang="ja-JP" dirty="0" smtClean="0">
+                <a:solidFill>
+                  <a:schemeClr val="tx1"/>
+                </a:solidFill>
+              </a:rPr>
+              <a:t>D</a:t>
+            </a:r>
+            <a:endParaRPr kumimoji="1" lang="en-US" altLang="ja-JP" dirty="0" smtClean="0">
+              <a:solidFill>
+                <a:schemeClr val="tx1"/>
+              </a:solidFill>
+            </a:endParaRPr>
           </a:p>
           <a:p>
             <a:pPr algn="ctr"/>
@@ -4234,7 +4247,15 @@
                   <a:schemeClr val="tx1"/>
                 </a:solidFill>
               </a:rPr>
-              <a:t>IDF</a:t>
+              <a:t>IF</a:t>
+            </a:r>
+            <a:r>
+              <a:rPr kumimoji="1" lang="en-US" altLang="ja-JP" dirty="0" smtClean="0">
+                <a:solidFill>
+                  <a:schemeClr val="tx1"/>
+                </a:solidFill>
+              </a:rPr>
+              <a:t>D</a:t>
             </a:r>
             <a:endParaRPr kumimoji="1" lang="ja-JP" altLang="en-US" dirty="0">
               <a:solidFill>
@@ -4314,12 +4335,20 @@
           <a:p>
             <a:pPr algn="ctr"/>
             <a:r>
-              <a:rPr kumimoji="1" lang="en-US" altLang="ja-JP" dirty="0" smtClean="0">
+              <a:rPr kumimoji="1" lang="en-US" altLang="ja-JP" smtClean="0">
                 <a:solidFill>
                   <a:schemeClr val="tx1"/>
                 </a:solidFill>
               </a:rPr>
-              <a:t>IDF</a:t>
+              <a:t>IF</a:t>
+            </a:r>
+            <a:r>
+              <a:rPr kumimoji="1" lang="en-US" altLang="ja-JP" smtClean="0">
+                <a:solidFill>
+                  <a:schemeClr val="tx1"/>
+                </a:solidFill>
+              </a:rPr>
+              <a:t>D</a:t>
             </a:r>
             <a:endParaRPr kumimoji="1" lang="ja-JP" altLang="en-US" dirty="0">
               <a:solidFill>

</xml_diff>